<commit_message>
Add Administrative Manual and update presentation
</commit_message>
<xml_diff>
--- a/Documentation Portion/Project BR04D$W0RD Presentation.pptx
+++ b/Documentation Portion/Project BR04D$W0RD Presentation.pptx
@@ -322,7 +322,7 @@
           <a:p>
             <a:fld id="{4AAD347D-5ACD-4C99-B74B-A9C85AD731AF}" type="datetimeFigureOut">
               <a:rPr lang="en-US" dirty="0"/>
-              <a:t>12/11/2019</a:t>
+              <a:t>12/12/2019</a:t>
             </a:fld>
             <a:endParaRPr lang="en-US"/>
           </a:p>
@@ -592,7 +592,7 @@
           <a:p>
             <a:fld id="{4509A250-FF31-4206-8172-F9D3106AACB1}" type="datetimeFigureOut">
               <a:rPr lang="en-US" dirty="0"/>
-              <a:t>12/11/2019</a:t>
+              <a:t>12/12/2019</a:t>
             </a:fld>
             <a:endParaRPr lang="en-US"/>
           </a:p>
@@ -785,7 +785,7 @@
           <a:p>
             <a:fld id="{4509A250-FF31-4206-8172-F9D3106AACB1}" type="datetimeFigureOut">
               <a:rPr lang="en-US" dirty="0"/>
-              <a:t>12/11/2019</a:t>
+              <a:t>12/12/2019</a:t>
             </a:fld>
             <a:endParaRPr lang="en-US"/>
           </a:p>
@@ -1057,7 +1057,7 @@
           <a:p>
             <a:fld id="{4509A250-FF31-4206-8172-F9D3106AACB1}" type="datetimeFigureOut">
               <a:rPr lang="en-US" dirty="0"/>
-              <a:t>12/11/2019</a:t>
+              <a:t>12/12/2019</a:t>
             </a:fld>
             <a:endParaRPr lang="en-US"/>
           </a:p>
@@ -1397,7 +1397,7 @@
           <a:p>
             <a:fld id="{4509A250-FF31-4206-8172-F9D3106AACB1}" type="datetimeFigureOut">
               <a:rPr lang="en-US" dirty="0"/>
-              <a:t>12/11/2019</a:t>
+              <a:t>12/12/2019</a:t>
             </a:fld>
             <a:endParaRPr lang="en-US"/>
           </a:p>
@@ -2019,7 +2019,7 @@
           <a:p>
             <a:fld id="{4509A250-FF31-4206-8172-F9D3106AACB1}" type="datetimeFigureOut">
               <a:rPr lang="en-US" dirty="0"/>
-              <a:t>12/11/2019</a:t>
+              <a:t>12/12/2019</a:t>
             </a:fld>
             <a:endParaRPr lang="en-US"/>
           </a:p>
@@ -2866,7 +2866,7 @@
           <a:p>
             <a:fld id="{4509A250-FF31-4206-8172-F9D3106AACB1}" type="datetimeFigureOut">
               <a:rPr lang="en-US" dirty="0"/>
-              <a:t>12/11/2019</a:t>
+              <a:t>12/12/2019</a:t>
             </a:fld>
             <a:endParaRPr lang="en-US"/>
           </a:p>
@@ -3034,7 +3034,7 @@
           <a:p>
             <a:fld id="{4509A250-FF31-4206-8172-F9D3106AACB1}" type="datetimeFigureOut">
               <a:rPr lang="en-US" dirty="0"/>
-              <a:t>12/11/2019</a:t>
+              <a:t>12/12/2019</a:t>
             </a:fld>
             <a:endParaRPr lang="en-US"/>
           </a:p>
@@ -3212,7 +3212,7 @@
           <a:p>
             <a:fld id="{4509A250-FF31-4206-8172-F9D3106AACB1}" type="datetimeFigureOut">
               <a:rPr lang="en-US" dirty="0"/>
-              <a:t>12/11/2019</a:t>
+              <a:t>12/12/2019</a:t>
             </a:fld>
             <a:endParaRPr lang="en-US"/>
           </a:p>
@@ -3380,7 +3380,7 @@
           <a:p>
             <a:fld id="{4509A250-FF31-4206-8172-F9D3106AACB1}" type="datetimeFigureOut">
               <a:rPr lang="en-US" dirty="0"/>
-              <a:t>12/11/2019</a:t>
+              <a:t>12/12/2019</a:t>
             </a:fld>
             <a:endParaRPr lang="en-US"/>
           </a:p>
@@ -3626,7 +3626,7 @@
           <a:p>
             <a:fld id="{9796027F-7875-4030-9381-8BD8C4F21935}" type="datetimeFigureOut">
               <a:rPr lang="en-US" dirty="0"/>
-              <a:t>12/11/2019</a:t>
+              <a:t>12/12/2019</a:t>
             </a:fld>
             <a:endParaRPr lang="en-US"/>
           </a:p>
@@ -3915,7 +3915,7 @@
           <a:p>
             <a:fld id="{9796027F-7875-4030-9381-8BD8C4F21935}" type="datetimeFigureOut">
               <a:rPr lang="en-US" dirty="0"/>
-              <a:t>12/11/2019</a:t>
+              <a:t>12/12/2019</a:t>
             </a:fld>
             <a:endParaRPr lang="en-US"/>
           </a:p>
@@ -4356,7 +4356,7 @@
           <a:p>
             <a:fld id="{9796027F-7875-4030-9381-8BD8C4F21935}" type="datetimeFigureOut">
               <a:rPr lang="en-US" dirty="0"/>
-              <a:t>12/11/2019</a:t>
+              <a:t>12/12/2019</a:t>
             </a:fld>
             <a:endParaRPr lang="en-US"/>
           </a:p>
@@ -4473,7 +4473,7 @@
           <a:p>
             <a:fld id="{4509A250-FF31-4206-8172-F9D3106AACB1}" type="datetimeFigureOut">
               <a:rPr lang="en-US" dirty="0"/>
-              <a:t>12/11/2019</a:t>
+              <a:t>12/12/2019</a:t>
             </a:fld>
             <a:endParaRPr lang="en-US"/>
           </a:p>
@@ -4568,7 +4568,7 @@
           <a:p>
             <a:fld id="{4509A250-FF31-4206-8172-F9D3106AACB1}" type="datetimeFigureOut">
               <a:rPr lang="en-US" dirty="0"/>
-              <a:t>12/11/2019</a:t>
+              <a:t>12/12/2019</a:t>
             </a:fld>
             <a:endParaRPr lang="en-US"/>
           </a:p>
@@ -4845,7 +4845,7 @@
           <a:p>
             <a:fld id="{4509A250-FF31-4206-8172-F9D3106AACB1}" type="datetimeFigureOut">
               <a:rPr lang="en-US" dirty="0"/>
-              <a:t>12/11/2019</a:t>
+              <a:t>12/12/2019</a:t>
             </a:fld>
             <a:endParaRPr lang="en-US"/>
           </a:p>
@@ -5115,7 +5115,7 @@
           <a:p>
             <a:fld id="{4509A250-FF31-4206-8172-F9D3106AACB1}" type="datetimeFigureOut">
               <a:rPr lang="en-US" dirty="0"/>
-              <a:t>12/11/2019</a:t>
+              <a:t>12/12/2019</a:t>
             </a:fld>
             <a:endParaRPr lang="en-US"/>
           </a:p>
@@ -5542,7 +5542,7 @@
           <a:p>
             <a:fld id="{4AAD347D-5ACD-4C99-B74B-A9C85AD731AF}" type="datetimeFigureOut">
               <a:rPr lang="en-US" dirty="0"/>
-              <a:t>12/11/2019</a:t>
+              <a:t>12/12/2019</a:t>
             </a:fld>
             <a:endParaRPr lang="en-US"/>
           </a:p>
@@ -8639,6 +8639,21 @@
 </file>
 
 <file path=customXml/item1.xml><?xml version="1.0" encoding="utf-8"?>
+<?mso-contentType ?>
+<FormTemplates xmlns="http://schemas.microsoft.com/sharepoint/v3/contenttype/forms">
+  <Display>DocumentLibraryForm</Display>
+  <Edit>DocumentLibraryForm</Edit>
+  <New>DocumentLibraryForm</New>
+</FormTemplates>
+</file>
+
+<file path=customXml/item2.xml><?xml version="1.0" encoding="utf-8"?>
+<p:properties xmlns:p="http://schemas.microsoft.com/office/2006/metadata/properties" xmlns:xsi="http://www.w3.org/2001/XMLSchema-instance" xmlns:pc="http://schemas.microsoft.com/office/infopath/2007/PartnerControls">
+  <documentManagement/>
+</p:properties>
+</file>
+
+<file path=customXml/item3.xml><?xml version="1.0" encoding="utf-8"?>
 <ct:contentTypeSchema xmlns:ct="http://schemas.microsoft.com/office/2006/metadata/contentType" xmlns:ma="http://schemas.microsoft.com/office/2006/metadata/properties/metaAttributes" ct:_="" ma:_="" ma:contentTypeName="Document" ma:contentTypeID="0x010100ED8A33792971EA4E8AD97F5279CEA3B3" ma:contentTypeVersion="2" ma:contentTypeDescription="Create a new document." ma:contentTypeScope="" ma:versionID="7c35f6d410eae26e8e29b976015e7b1c">
   <xsd:schema xmlns:xsd="http://www.w3.org/2001/XMLSchema" xmlns:xs="http://www.w3.org/2001/XMLSchema" xmlns:p="http://schemas.microsoft.com/office/2006/metadata/properties" xmlns:ns2="63c40743-66dd-40ff-9596-cc4cc7dde7b9" targetNamespace="http://schemas.microsoft.com/office/2006/metadata/properties" ma:root="true" ma:fieldsID="891801701171fdfe2471deb48240531a" ns2:_="">
     <xsd:import namespace="63c40743-66dd-40ff-9596-cc4cc7dde7b9"/>
@@ -8770,22 +8785,24 @@
 </ct:contentTypeSchema>
 </file>
 
-<file path=customXml/item2.xml><?xml version="1.0" encoding="utf-8"?>
-<p:properties xmlns:p="http://schemas.microsoft.com/office/2006/metadata/properties" xmlns:xsi="http://www.w3.org/2001/XMLSchema-instance" xmlns:pc="http://schemas.microsoft.com/office/infopath/2007/PartnerControls">
-  <documentManagement/>
-</p:properties>
+<file path=customXml/itemProps1.xml><?xml version="1.0" encoding="utf-8"?>
+<ds:datastoreItem xmlns:ds="http://schemas.openxmlformats.org/officeDocument/2006/customXml" ds:itemID="{A8AB16ED-2337-4C9B-9659-585654D566E0}">
+  <ds:schemaRefs>
+    <ds:schemaRef ds:uri="http://schemas.microsoft.com/sharepoint/v3/contenttype/forms"/>
+  </ds:schemaRefs>
+</ds:datastoreItem>
 </file>
 
-<file path=customXml/item3.xml><?xml version="1.0" encoding="utf-8"?>
-<?mso-contentType ?>
-<FormTemplates xmlns="http://schemas.microsoft.com/sharepoint/v3/contenttype/forms">
-  <Display>DocumentLibraryForm</Display>
-  <Edit>DocumentLibraryForm</Edit>
-  <New>DocumentLibraryForm</New>
-</FormTemplates>
+<file path=customXml/itemProps2.xml><?xml version="1.0" encoding="utf-8"?>
+<ds:datastoreItem xmlns:ds="http://schemas.openxmlformats.org/officeDocument/2006/customXml" ds:itemID="{E656DB18-B079-459D-859E-891BD77DD402}">
+  <ds:schemaRefs>
+    <ds:schemaRef ds:uri="http://schemas.microsoft.com/office/2006/metadata/properties"/>
+    <ds:schemaRef ds:uri="http://schemas.microsoft.com/office/infopath/2007/PartnerControls"/>
+  </ds:schemaRefs>
+</ds:datastoreItem>
 </file>
 
-<file path=customXml/itemProps1.xml><?xml version="1.0" encoding="utf-8"?>
+<file path=customXml/itemProps3.xml><?xml version="1.0" encoding="utf-8"?>
 <ds:datastoreItem xmlns:ds="http://schemas.openxmlformats.org/officeDocument/2006/customXml" ds:itemID="{BE57B109-084F-4E60-B9B3-5291375DFEE3}">
   <ds:schemaRefs>
     <ds:schemaRef ds:uri="http://schemas.microsoft.com/office/2006/metadata/contentType"/>
@@ -8801,21 +8818,4 @@
     <ds:schemaRef ds:uri="http://schemas.microsoft.com/internal/obd"/>
   </ds:schemaRefs>
 </ds:datastoreItem>
-</file>
-
-<file path=customXml/itemProps2.xml><?xml version="1.0" encoding="utf-8"?>
-<ds:datastoreItem xmlns:ds="http://schemas.openxmlformats.org/officeDocument/2006/customXml" ds:itemID="{E656DB18-B079-459D-859E-891BD77DD402}">
-  <ds:schemaRefs>
-    <ds:schemaRef ds:uri="http://schemas.microsoft.com/office/2006/metadata/properties"/>
-    <ds:schemaRef ds:uri="http://schemas.microsoft.com/office/infopath/2007/PartnerControls"/>
-  </ds:schemaRefs>
-</ds:datastoreItem>
-</file>
-
-<file path=customXml/itemProps3.xml><?xml version="1.0" encoding="utf-8"?>
-<ds:datastoreItem xmlns:ds="http://schemas.openxmlformats.org/officeDocument/2006/customXml" ds:itemID="{A8AB16ED-2337-4C9B-9659-585654D566E0}">
-  <ds:schemaRefs>
-    <ds:schemaRef ds:uri="http://schemas.microsoft.com/sharepoint/v3/contenttype/forms"/>
-  </ds:schemaRefs>
-</ds:datastoreItem>
 </file>
</xml_diff>